<commit_message>
currently update for UI
currently update for UI
</commit_message>
<xml_diff>
--- a/170405 AMI 얼굴인식모듈 개발.pptx
+++ b/170405 AMI 얼굴인식모듈 개발.pptx
@@ -4,11 +4,16 @@
   <p:sldMasterIdLst>
     <p:sldMasterId id="2147483648" r:id="rId1"/>
   </p:sldMasterIdLst>
+  <p:notesMasterIdLst>
+    <p:notesMasterId r:id="rId8"/>
+  </p:notesMasterIdLst>
   <p:sldIdLst>
     <p:sldId id="256" r:id="rId2"/>
     <p:sldId id="257" r:id="rId3"/>
     <p:sldId id="258" r:id="rId4"/>
     <p:sldId id="259" r:id="rId5"/>
+    <p:sldId id="260" r:id="rId6"/>
+    <p:sldId id="261" r:id="rId7"/>
   </p:sldIdLst>
   <p:sldSz cx="12192000" cy="6858000"/>
   <p:notesSz cx="6858000" cy="9144000"/>
@@ -107,7 +112,446 @@
       </a:defRPr>
     </a:lvl9pPr>
   </p:defaultTextStyle>
+  <p:extLst>
+    <p:ext uri="{EFAFB233-063F-42B5-8137-9DF3F51BA10A}">
+      <p15:sldGuideLst xmlns:p15="http://schemas.microsoft.com/office/powerpoint/2012/main"/>
+    </p:ext>
+  </p:extLst>
 </p:presentation>
+</file>
+
+<file path=ppt/notesMasters/notesMaster1.xml><?xml version="1.0" encoding="utf-8"?>
+<p:notesMaster xmlns:a="http://schemas.openxmlformats.org/drawingml/2006/main" xmlns:r="http://schemas.openxmlformats.org/officeDocument/2006/relationships" xmlns:p="http://schemas.openxmlformats.org/presentationml/2006/main">
+  <p:cSld>
+    <p:bg>
+      <p:bgRef idx="1001">
+        <a:schemeClr val="bg1"/>
+      </p:bgRef>
+    </p:bg>
+    <p:spTree>
+      <p:nvGrpSpPr>
+        <p:cNvPr id="1" name=""/>
+        <p:cNvGrpSpPr/>
+        <p:nvPr/>
+      </p:nvGrpSpPr>
+      <p:grpSpPr>
+        <a:xfrm>
+          <a:off x="0" y="0"/>
+          <a:ext cx="0" cy="0"/>
+          <a:chOff x="0" y="0"/>
+          <a:chExt cx="0" cy="0"/>
+        </a:xfrm>
+      </p:grpSpPr>
+      <p:sp>
+        <p:nvSpPr>
+          <p:cNvPr id="2" name="머리글 개체 틀 1"/>
+          <p:cNvSpPr>
+            <a:spLocks noGrp="1"/>
+          </p:cNvSpPr>
+          <p:nvPr>
+            <p:ph type="hdr" sz="quarter"/>
+          </p:nvPr>
+        </p:nvSpPr>
+        <p:spPr>
+          <a:xfrm>
+            <a:off x="0" y="0"/>
+            <a:ext cx="2971800" cy="458788"/>
+          </a:xfrm>
+          <a:prstGeom prst="rect">
+            <a:avLst/>
+          </a:prstGeom>
+        </p:spPr>
+        <p:txBody>
+          <a:bodyPr vert="horz" lIns="91440" tIns="45720" rIns="91440" bIns="45720" rtlCol="0"/>
+          <a:lstStyle>
+            <a:lvl1pPr algn="l">
+              <a:defRPr sz="1200"/>
+            </a:lvl1pPr>
+          </a:lstStyle>
+          <a:p>
+            <a:endParaRPr lang="ko-KR" altLang="en-US"/>
+          </a:p>
+        </p:txBody>
+      </p:sp>
+      <p:sp>
+        <p:nvSpPr>
+          <p:cNvPr id="3" name="날짜 개체 틀 2"/>
+          <p:cNvSpPr>
+            <a:spLocks noGrp="1"/>
+          </p:cNvSpPr>
+          <p:nvPr>
+            <p:ph type="dt" idx="1"/>
+          </p:nvPr>
+        </p:nvSpPr>
+        <p:spPr>
+          <a:xfrm>
+            <a:off x="3884613" y="0"/>
+            <a:ext cx="2971800" cy="458788"/>
+          </a:xfrm>
+          <a:prstGeom prst="rect">
+            <a:avLst/>
+          </a:prstGeom>
+        </p:spPr>
+        <p:txBody>
+          <a:bodyPr vert="horz" lIns="91440" tIns="45720" rIns="91440" bIns="45720" rtlCol="0"/>
+          <a:lstStyle>
+            <a:lvl1pPr algn="r">
+              <a:defRPr sz="1200"/>
+            </a:lvl1pPr>
+          </a:lstStyle>
+          <a:p>
+            <a:fld id="{969AF9F4-AAF1-4ACC-8895-534B00757307}" type="datetimeFigureOut">
+              <a:rPr lang="ko-KR" altLang="en-US" smtClean="0"/>
+              <a:t>2017-04-06</a:t>
+            </a:fld>
+            <a:endParaRPr lang="ko-KR" altLang="en-US"/>
+          </a:p>
+        </p:txBody>
+      </p:sp>
+      <p:sp>
+        <p:nvSpPr>
+          <p:cNvPr id="4" name="슬라이드 이미지 개체 틀 3"/>
+          <p:cNvSpPr>
+            <a:spLocks noGrp="1" noRot="1" noChangeAspect="1"/>
+          </p:cNvSpPr>
+          <p:nvPr>
+            <p:ph type="sldImg" idx="2"/>
+          </p:nvPr>
+        </p:nvSpPr>
+        <p:spPr>
+          <a:xfrm>
+            <a:off x="685800" y="1143000"/>
+            <a:ext cx="5486400" cy="3086100"/>
+          </a:xfrm>
+          <a:prstGeom prst="rect">
+            <a:avLst/>
+          </a:prstGeom>
+          <a:noFill/>
+          <a:ln w="12700">
+            <a:solidFill>
+              <a:prstClr val="black"/>
+            </a:solidFill>
+          </a:ln>
+        </p:spPr>
+        <p:txBody>
+          <a:bodyPr vert="horz" lIns="91440" tIns="45720" rIns="91440" bIns="45720" rtlCol="0" anchor="ctr"/>
+          <a:lstStyle/>
+          <a:p>
+            <a:endParaRPr lang="ko-KR" altLang="en-US"/>
+          </a:p>
+        </p:txBody>
+      </p:sp>
+      <p:sp>
+        <p:nvSpPr>
+          <p:cNvPr id="5" name="슬라이드 노트 개체 틀 4"/>
+          <p:cNvSpPr>
+            <a:spLocks noGrp="1"/>
+          </p:cNvSpPr>
+          <p:nvPr>
+            <p:ph type="body" sz="quarter" idx="3"/>
+          </p:nvPr>
+        </p:nvSpPr>
+        <p:spPr>
+          <a:xfrm>
+            <a:off x="685800" y="4400550"/>
+            <a:ext cx="5486400" cy="3600450"/>
+          </a:xfrm>
+          <a:prstGeom prst="rect">
+            <a:avLst/>
+          </a:prstGeom>
+        </p:spPr>
+        <p:txBody>
+          <a:bodyPr vert="horz" lIns="91440" tIns="45720" rIns="91440" bIns="45720" rtlCol="0"/>
+          <a:lstStyle/>
+          <a:p>
+            <a:pPr lvl="0"/>
+            <a:r>
+              <a:rPr lang="ko-KR" altLang="en-US" smtClean="0"/>
+              <a:t>마스터 텍스트 스타일 편집</a:t>
+            </a:r>
+          </a:p>
+          <a:p>
+            <a:pPr lvl="1"/>
+            <a:r>
+              <a:rPr lang="ko-KR" altLang="en-US" smtClean="0"/>
+              <a:t>둘째 수준</a:t>
+            </a:r>
+          </a:p>
+          <a:p>
+            <a:pPr lvl="2"/>
+            <a:r>
+              <a:rPr lang="ko-KR" altLang="en-US" smtClean="0"/>
+              <a:t>셋째 수준</a:t>
+            </a:r>
+          </a:p>
+          <a:p>
+            <a:pPr lvl="3"/>
+            <a:r>
+              <a:rPr lang="ko-KR" altLang="en-US" smtClean="0"/>
+              <a:t>넷째 수준</a:t>
+            </a:r>
+          </a:p>
+          <a:p>
+            <a:pPr lvl="4"/>
+            <a:r>
+              <a:rPr lang="ko-KR" altLang="en-US" smtClean="0"/>
+              <a:t>다섯째 수준</a:t>
+            </a:r>
+            <a:endParaRPr lang="ko-KR" altLang="en-US"/>
+          </a:p>
+        </p:txBody>
+      </p:sp>
+      <p:sp>
+        <p:nvSpPr>
+          <p:cNvPr id="6" name="바닥글 개체 틀 5"/>
+          <p:cNvSpPr>
+            <a:spLocks noGrp="1"/>
+          </p:cNvSpPr>
+          <p:nvPr>
+            <p:ph type="ftr" sz="quarter" idx="4"/>
+          </p:nvPr>
+        </p:nvSpPr>
+        <p:spPr>
+          <a:xfrm>
+            <a:off x="0" y="8685213"/>
+            <a:ext cx="2971800" cy="458787"/>
+          </a:xfrm>
+          <a:prstGeom prst="rect">
+            <a:avLst/>
+          </a:prstGeom>
+        </p:spPr>
+        <p:txBody>
+          <a:bodyPr vert="horz" lIns="91440" tIns="45720" rIns="91440" bIns="45720" rtlCol="0" anchor="b"/>
+          <a:lstStyle>
+            <a:lvl1pPr algn="l">
+              <a:defRPr sz="1200"/>
+            </a:lvl1pPr>
+          </a:lstStyle>
+          <a:p>
+            <a:endParaRPr lang="ko-KR" altLang="en-US"/>
+          </a:p>
+        </p:txBody>
+      </p:sp>
+      <p:sp>
+        <p:nvSpPr>
+          <p:cNvPr id="7" name="슬라이드 번호 개체 틀 6"/>
+          <p:cNvSpPr>
+            <a:spLocks noGrp="1"/>
+          </p:cNvSpPr>
+          <p:nvPr>
+            <p:ph type="sldNum" sz="quarter" idx="5"/>
+          </p:nvPr>
+        </p:nvSpPr>
+        <p:spPr>
+          <a:xfrm>
+            <a:off x="3884613" y="8685213"/>
+            <a:ext cx="2971800" cy="458787"/>
+          </a:xfrm>
+          <a:prstGeom prst="rect">
+            <a:avLst/>
+          </a:prstGeom>
+        </p:spPr>
+        <p:txBody>
+          <a:bodyPr vert="horz" lIns="91440" tIns="45720" rIns="91440" bIns="45720" rtlCol="0" anchor="b"/>
+          <a:lstStyle>
+            <a:lvl1pPr algn="r">
+              <a:defRPr sz="1200"/>
+            </a:lvl1pPr>
+          </a:lstStyle>
+          <a:p>
+            <a:fld id="{6C84F30E-C1C8-46F9-87FB-73A16C302A00}" type="slidenum">
+              <a:rPr lang="ko-KR" altLang="en-US" smtClean="0"/>
+              <a:t>‹#›</a:t>
+            </a:fld>
+            <a:endParaRPr lang="ko-KR" altLang="en-US"/>
+          </a:p>
+        </p:txBody>
+      </p:sp>
+    </p:spTree>
+    <p:extLst>
+      <p:ext uri="{BB962C8B-B14F-4D97-AF65-F5344CB8AC3E}">
+        <p14:creationId xmlns:p14="http://schemas.microsoft.com/office/powerpoint/2010/main" val="1525138567"/>
+      </p:ext>
+    </p:extLst>
+  </p:cSld>
+  <p:clrMap bg1="lt1" tx1="dk1" bg2="lt2" tx2="dk2" accent1="accent1" accent2="accent2" accent3="accent3" accent4="accent4" accent5="accent5" accent6="accent6" hlink="hlink" folHlink="folHlink"/>
+  <p:notesStyle>
+    <a:lvl1pPr marL="0" algn="l" defTabSz="914400" rtl="0" eaLnBrk="1" latinLnBrk="1" hangingPunct="1">
+      <a:defRPr sz="1200" kern="1200">
+        <a:solidFill>
+          <a:schemeClr val="tx1"/>
+        </a:solidFill>
+        <a:latin typeface="+mn-lt"/>
+        <a:ea typeface="+mn-ea"/>
+        <a:cs typeface="+mn-cs"/>
+      </a:defRPr>
+    </a:lvl1pPr>
+    <a:lvl2pPr marL="457200" algn="l" defTabSz="914400" rtl="0" eaLnBrk="1" latinLnBrk="1" hangingPunct="1">
+      <a:defRPr sz="1200" kern="1200">
+        <a:solidFill>
+          <a:schemeClr val="tx1"/>
+        </a:solidFill>
+        <a:latin typeface="+mn-lt"/>
+        <a:ea typeface="+mn-ea"/>
+        <a:cs typeface="+mn-cs"/>
+      </a:defRPr>
+    </a:lvl2pPr>
+    <a:lvl3pPr marL="914400" algn="l" defTabSz="914400" rtl="0" eaLnBrk="1" latinLnBrk="1" hangingPunct="1">
+      <a:defRPr sz="1200" kern="1200">
+        <a:solidFill>
+          <a:schemeClr val="tx1"/>
+        </a:solidFill>
+        <a:latin typeface="+mn-lt"/>
+        <a:ea typeface="+mn-ea"/>
+        <a:cs typeface="+mn-cs"/>
+      </a:defRPr>
+    </a:lvl3pPr>
+    <a:lvl4pPr marL="1371600" algn="l" defTabSz="914400" rtl="0" eaLnBrk="1" latinLnBrk="1" hangingPunct="1">
+      <a:defRPr sz="1200" kern="1200">
+        <a:solidFill>
+          <a:schemeClr val="tx1"/>
+        </a:solidFill>
+        <a:latin typeface="+mn-lt"/>
+        <a:ea typeface="+mn-ea"/>
+        <a:cs typeface="+mn-cs"/>
+      </a:defRPr>
+    </a:lvl4pPr>
+    <a:lvl5pPr marL="1828800" algn="l" defTabSz="914400" rtl="0" eaLnBrk="1" latinLnBrk="1" hangingPunct="1">
+      <a:defRPr sz="1200" kern="1200">
+        <a:solidFill>
+          <a:schemeClr val="tx1"/>
+        </a:solidFill>
+        <a:latin typeface="+mn-lt"/>
+        <a:ea typeface="+mn-ea"/>
+        <a:cs typeface="+mn-cs"/>
+      </a:defRPr>
+    </a:lvl5pPr>
+    <a:lvl6pPr marL="2286000" algn="l" defTabSz="914400" rtl="0" eaLnBrk="1" latinLnBrk="1" hangingPunct="1">
+      <a:defRPr sz="1200" kern="1200">
+        <a:solidFill>
+          <a:schemeClr val="tx1"/>
+        </a:solidFill>
+        <a:latin typeface="+mn-lt"/>
+        <a:ea typeface="+mn-ea"/>
+        <a:cs typeface="+mn-cs"/>
+      </a:defRPr>
+    </a:lvl6pPr>
+    <a:lvl7pPr marL="2743200" algn="l" defTabSz="914400" rtl="0" eaLnBrk="1" latinLnBrk="1" hangingPunct="1">
+      <a:defRPr sz="1200" kern="1200">
+        <a:solidFill>
+          <a:schemeClr val="tx1"/>
+        </a:solidFill>
+        <a:latin typeface="+mn-lt"/>
+        <a:ea typeface="+mn-ea"/>
+        <a:cs typeface="+mn-cs"/>
+      </a:defRPr>
+    </a:lvl7pPr>
+    <a:lvl8pPr marL="3200400" algn="l" defTabSz="914400" rtl="0" eaLnBrk="1" latinLnBrk="1" hangingPunct="1">
+      <a:defRPr sz="1200" kern="1200">
+        <a:solidFill>
+          <a:schemeClr val="tx1"/>
+        </a:solidFill>
+        <a:latin typeface="+mn-lt"/>
+        <a:ea typeface="+mn-ea"/>
+        <a:cs typeface="+mn-cs"/>
+      </a:defRPr>
+    </a:lvl8pPr>
+    <a:lvl9pPr marL="3657600" algn="l" defTabSz="914400" rtl="0" eaLnBrk="1" latinLnBrk="1" hangingPunct="1">
+      <a:defRPr sz="1200" kern="1200">
+        <a:solidFill>
+          <a:schemeClr val="tx1"/>
+        </a:solidFill>
+        <a:latin typeface="+mn-lt"/>
+        <a:ea typeface="+mn-ea"/>
+        <a:cs typeface="+mn-cs"/>
+      </a:defRPr>
+    </a:lvl9pPr>
+  </p:notesStyle>
+</p:notesMaster>
+</file>
+
+<file path=ppt/notesSlides/notesSlide1.xml><?xml version="1.0" encoding="utf-8"?>
+<p:notes xmlns:a="http://schemas.openxmlformats.org/drawingml/2006/main" xmlns:r="http://schemas.openxmlformats.org/officeDocument/2006/relationships" xmlns:p="http://schemas.openxmlformats.org/presentationml/2006/main">
+  <p:cSld>
+    <p:spTree>
+      <p:nvGrpSpPr>
+        <p:cNvPr id="1" name=""/>
+        <p:cNvGrpSpPr/>
+        <p:nvPr/>
+      </p:nvGrpSpPr>
+      <p:grpSpPr>
+        <a:xfrm>
+          <a:off x="0" y="0"/>
+          <a:ext cx="0" cy="0"/>
+          <a:chOff x="0" y="0"/>
+          <a:chExt cx="0" cy="0"/>
+        </a:xfrm>
+      </p:grpSpPr>
+      <p:sp>
+        <p:nvSpPr>
+          <p:cNvPr id="2" name="슬라이드 이미지 개체 틀 1"/>
+          <p:cNvSpPr>
+            <a:spLocks noGrp="1" noRot="1" noChangeAspect="1"/>
+          </p:cNvSpPr>
+          <p:nvPr>
+            <p:ph type="sldImg"/>
+          </p:nvPr>
+        </p:nvSpPr>
+        <p:spPr/>
+      </p:sp>
+      <p:sp>
+        <p:nvSpPr>
+          <p:cNvPr id="3" name="슬라이드 노트 개체 틀 2"/>
+          <p:cNvSpPr>
+            <a:spLocks noGrp="1"/>
+          </p:cNvSpPr>
+          <p:nvPr>
+            <p:ph type="body" idx="1"/>
+          </p:nvPr>
+        </p:nvSpPr>
+        <p:spPr/>
+        <p:txBody>
+          <a:bodyPr/>
+          <a:lstStyle/>
+          <a:p>
+            <a:endParaRPr lang="ko-KR" altLang="en-US" dirty="0"/>
+          </a:p>
+        </p:txBody>
+      </p:sp>
+      <p:sp>
+        <p:nvSpPr>
+          <p:cNvPr id="4" name="슬라이드 번호 개체 틀 3"/>
+          <p:cNvSpPr>
+            <a:spLocks noGrp="1"/>
+          </p:cNvSpPr>
+          <p:nvPr>
+            <p:ph type="sldNum" sz="quarter" idx="10"/>
+          </p:nvPr>
+        </p:nvSpPr>
+        <p:spPr/>
+        <p:txBody>
+          <a:bodyPr/>
+          <a:lstStyle/>
+          <a:p>
+            <a:fld id="{6C84F30E-C1C8-46F9-87FB-73A16C302A00}" type="slidenum">
+              <a:rPr lang="ko-KR" altLang="en-US" smtClean="0"/>
+              <a:t>6</a:t>
+            </a:fld>
+            <a:endParaRPr lang="ko-KR" altLang="en-US"/>
+          </a:p>
+        </p:txBody>
+      </p:sp>
+    </p:spTree>
+    <p:extLst>
+      <p:ext uri="{BB962C8B-B14F-4D97-AF65-F5344CB8AC3E}">
+        <p14:creationId xmlns:p14="http://schemas.microsoft.com/office/powerpoint/2010/main" val="1472764434"/>
+      </p:ext>
+    </p:extLst>
+  </p:cSld>
+  <p:clrMapOvr>
+    <a:masterClrMapping/>
+  </p:clrMapOvr>
+</p:notes>
 </file>
 
 <file path=ppt/slideLayouts/slideLayout1.xml><?xml version="1.0" encoding="utf-8"?>
@@ -241,7 +685,7 @@
           <a:p>
             <a:fld id="{566196E9-691D-44A0-A085-EA62581AF33E}" type="datetimeFigureOut">
               <a:rPr lang="ko-KR" altLang="en-US" smtClean="0"/>
-              <a:t>2017-04-05</a:t>
+              <a:t>2017-04-06</a:t>
             </a:fld>
             <a:endParaRPr lang="ko-KR" altLang="en-US"/>
           </a:p>
@@ -411,7 +855,7 @@
           <a:p>
             <a:fld id="{566196E9-691D-44A0-A085-EA62581AF33E}" type="datetimeFigureOut">
               <a:rPr lang="ko-KR" altLang="en-US" smtClean="0"/>
-              <a:t>2017-04-05</a:t>
+              <a:t>2017-04-06</a:t>
             </a:fld>
             <a:endParaRPr lang="ko-KR" altLang="en-US"/>
           </a:p>
@@ -591,7 +1035,7 @@
           <a:p>
             <a:fld id="{566196E9-691D-44A0-A085-EA62581AF33E}" type="datetimeFigureOut">
               <a:rPr lang="ko-KR" altLang="en-US" smtClean="0"/>
-              <a:t>2017-04-05</a:t>
+              <a:t>2017-04-06</a:t>
             </a:fld>
             <a:endParaRPr lang="ko-KR" altLang="en-US"/>
           </a:p>
@@ -761,7 +1205,7 @@
           <a:p>
             <a:fld id="{566196E9-691D-44A0-A085-EA62581AF33E}" type="datetimeFigureOut">
               <a:rPr lang="ko-KR" altLang="en-US" smtClean="0"/>
-              <a:t>2017-04-05</a:t>
+              <a:t>2017-04-06</a:t>
             </a:fld>
             <a:endParaRPr lang="ko-KR" altLang="en-US"/>
           </a:p>
@@ -1007,7 +1451,7 @@
           <a:p>
             <a:fld id="{566196E9-691D-44A0-A085-EA62581AF33E}" type="datetimeFigureOut">
               <a:rPr lang="ko-KR" altLang="en-US" smtClean="0"/>
-              <a:t>2017-04-05</a:t>
+              <a:t>2017-04-06</a:t>
             </a:fld>
             <a:endParaRPr lang="ko-KR" altLang="en-US"/>
           </a:p>
@@ -1239,7 +1683,7 @@
           <a:p>
             <a:fld id="{566196E9-691D-44A0-A085-EA62581AF33E}" type="datetimeFigureOut">
               <a:rPr lang="ko-KR" altLang="en-US" smtClean="0"/>
-              <a:t>2017-04-05</a:t>
+              <a:t>2017-04-06</a:t>
             </a:fld>
             <a:endParaRPr lang="ko-KR" altLang="en-US"/>
           </a:p>
@@ -1606,7 +2050,7 @@
           <a:p>
             <a:fld id="{566196E9-691D-44A0-A085-EA62581AF33E}" type="datetimeFigureOut">
               <a:rPr lang="ko-KR" altLang="en-US" smtClean="0"/>
-              <a:t>2017-04-05</a:t>
+              <a:t>2017-04-06</a:t>
             </a:fld>
             <a:endParaRPr lang="ko-KR" altLang="en-US"/>
           </a:p>
@@ -1724,7 +2168,7 @@
           <a:p>
             <a:fld id="{566196E9-691D-44A0-A085-EA62581AF33E}" type="datetimeFigureOut">
               <a:rPr lang="ko-KR" altLang="en-US" smtClean="0"/>
-              <a:t>2017-04-05</a:t>
+              <a:t>2017-04-06</a:t>
             </a:fld>
             <a:endParaRPr lang="ko-KR" altLang="en-US"/>
           </a:p>
@@ -1819,7 +2263,7 @@
           <a:p>
             <a:fld id="{566196E9-691D-44A0-A085-EA62581AF33E}" type="datetimeFigureOut">
               <a:rPr lang="ko-KR" altLang="en-US" smtClean="0"/>
-              <a:t>2017-04-05</a:t>
+              <a:t>2017-04-06</a:t>
             </a:fld>
             <a:endParaRPr lang="ko-KR" altLang="en-US"/>
           </a:p>
@@ -2096,7 +2540,7 @@
           <a:p>
             <a:fld id="{566196E9-691D-44A0-A085-EA62581AF33E}" type="datetimeFigureOut">
               <a:rPr lang="ko-KR" altLang="en-US" smtClean="0"/>
-              <a:t>2017-04-05</a:t>
+              <a:t>2017-04-06</a:t>
             </a:fld>
             <a:endParaRPr lang="ko-KR" altLang="en-US"/>
           </a:p>
@@ -2349,7 +2793,7 @@
           <a:p>
             <a:fld id="{566196E9-691D-44A0-A085-EA62581AF33E}" type="datetimeFigureOut">
               <a:rPr lang="ko-KR" altLang="en-US" smtClean="0"/>
-              <a:t>2017-04-05</a:t>
+              <a:t>2017-04-06</a:t>
             </a:fld>
             <a:endParaRPr lang="ko-KR" altLang="en-US"/>
           </a:p>
@@ -2562,7 +3006,7 @@
           <a:p>
             <a:fld id="{566196E9-691D-44A0-A085-EA62581AF33E}" type="datetimeFigureOut">
               <a:rPr lang="ko-KR" altLang="en-US" smtClean="0"/>
-              <a:t>2017-04-05</a:t>
+              <a:t>2017-04-06</a:t>
             </a:fld>
             <a:endParaRPr lang="ko-KR" altLang="en-US"/>
           </a:p>
@@ -3716,7 +4160,7 @@
               <a:t>dll</a:t>
             </a:r>
             <a:r>
-              <a:rPr lang="ko-KR" altLang="en-US" smtClean="0"/>
+              <a:rPr lang="ko-KR" altLang="en-US" dirty="0" smtClean="0"/>
               <a:t>만 돌리고 싶음</a:t>
             </a:r>
             <a:endParaRPr lang="en-US" altLang="ko-KR" dirty="0" smtClean="0"/>
@@ -3727,6 +4171,899 @@
     <p:extLst>
       <p:ext uri="{BB962C8B-B14F-4D97-AF65-F5344CB8AC3E}">
         <p14:creationId xmlns:p14="http://schemas.microsoft.com/office/powerpoint/2010/main" val="27183257"/>
+      </p:ext>
+    </p:extLst>
+  </p:cSld>
+  <p:clrMapOvr>
+    <a:masterClrMapping/>
+  </p:clrMapOvr>
+</p:sld>
+</file>
+
+<file path=ppt/slides/slide5.xml><?xml version="1.0" encoding="utf-8"?>
+<p:sld xmlns:a="http://schemas.openxmlformats.org/drawingml/2006/main" xmlns:r="http://schemas.openxmlformats.org/officeDocument/2006/relationships" xmlns:p="http://schemas.openxmlformats.org/presentationml/2006/main">
+  <p:cSld>
+    <p:spTree>
+      <p:nvGrpSpPr>
+        <p:cNvPr id="1" name=""/>
+        <p:cNvGrpSpPr/>
+        <p:nvPr/>
+      </p:nvGrpSpPr>
+      <p:grpSpPr>
+        <a:xfrm>
+          <a:off x="0" y="0"/>
+          <a:ext cx="0" cy="0"/>
+          <a:chOff x="0" y="0"/>
+          <a:chExt cx="0" cy="0"/>
+        </a:xfrm>
+      </p:grpSpPr>
+      <p:sp>
+        <p:nvSpPr>
+          <p:cNvPr id="2" name="제목 1"/>
+          <p:cNvSpPr>
+            <a:spLocks noGrp="1"/>
+          </p:cNvSpPr>
+          <p:nvPr>
+            <p:ph type="title"/>
+          </p:nvPr>
+        </p:nvSpPr>
+        <p:spPr/>
+        <p:txBody>
+          <a:bodyPr/>
+          <a:lstStyle/>
+          <a:p>
+            <a:r>
+              <a:rPr lang="en-US" altLang="ko-KR" dirty="0" smtClean="0"/>
+              <a:t>170406</a:t>
+            </a:r>
+            <a:endParaRPr lang="ko-KR" altLang="en-US" dirty="0"/>
+          </a:p>
+        </p:txBody>
+      </p:sp>
+      <p:sp>
+        <p:nvSpPr>
+          <p:cNvPr id="3" name="내용 개체 틀 2"/>
+          <p:cNvSpPr>
+            <a:spLocks noGrp="1"/>
+          </p:cNvSpPr>
+          <p:nvPr>
+            <p:ph idx="1"/>
+          </p:nvPr>
+        </p:nvSpPr>
+        <p:spPr/>
+        <p:txBody>
+          <a:bodyPr/>
+          <a:lstStyle/>
+          <a:p>
+            <a:r>
+              <a:rPr lang="ko-KR" altLang="en-US" dirty="0"/>
+              <a:t>카메라 </a:t>
+            </a:r>
+            <a:r>
+              <a:rPr lang="en-US" altLang="ko-KR" dirty="0"/>
+              <a:t>UI</a:t>
+            </a:r>
+            <a:r>
+              <a:rPr lang="ko-KR" altLang="en-US" dirty="0"/>
+              <a:t>단을 먼저 만들자</a:t>
+            </a:r>
+            <a:r>
+              <a:rPr lang="en-US" altLang="ko-KR" dirty="0"/>
+              <a:t>(train/test </a:t>
+            </a:r>
+            <a:r>
+              <a:rPr lang="ko-KR" altLang="en-US" dirty="0"/>
+              <a:t>등</a:t>
+            </a:r>
+            <a:r>
+              <a:rPr lang="en-US" altLang="ko-KR" dirty="0" smtClean="0"/>
+              <a:t>)</a:t>
+            </a:r>
+          </a:p>
+          <a:p>
+            <a:r>
+              <a:rPr lang="ko-KR" altLang="en-US" dirty="0" smtClean="0"/>
+              <a:t>일단 임시로 </a:t>
+            </a:r>
+            <a:r>
+              <a:rPr lang="en-US" altLang="ko-KR" dirty="0" smtClean="0"/>
+              <a:t>train, test </a:t>
+            </a:r>
+            <a:r>
+              <a:rPr lang="ko-KR" altLang="en-US" dirty="0" smtClean="0"/>
+              <a:t>버튼을 만들고 </a:t>
+            </a:r>
+            <a:r>
+              <a:rPr lang="ko-KR" altLang="en-US" dirty="0" err="1" smtClean="0"/>
+              <a:t>웹캠</a:t>
+            </a:r>
+            <a:r>
+              <a:rPr lang="ko-KR" altLang="en-US" dirty="0" smtClean="0"/>
+              <a:t> 화면도 촬영을 하고</a:t>
+            </a:r>
+            <a:endParaRPr lang="en-US" altLang="ko-KR" dirty="0" smtClean="0"/>
+          </a:p>
+          <a:p>
+            <a:r>
+              <a:rPr lang="en-US" altLang="ko-KR" dirty="0" smtClean="0"/>
+              <a:t>(</a:t>
+            </a:r>
+            <a:r>
+              <a:rPr lang="ko-KR" altLang="en-US" dirty="0" smtClean="0"/>
+              <a:t>본래는 </a:t>
+            </a:r>
+            <a:r>
+              <a:rPr lang="en-US" altLang="ko-KR" dirty="0" smtClean="0"/>
+              <a:t>bounding box</a:t>
+            </a:r>
+            <a:r>
+              <a:rPr lang="ko-KR" altLang="en-US" dirty="0" smtClean="0"/>
+              <a:t>도 나오면 </a:t>
+            </a:r>
+            <a:r>
+              <a:rPr lang="ko-KR" altLang="en-US" dirty="0" err="1" smtClean="0"/>
+              <a:t>좋을텐데</a:t>
+            </a:r>
+            <a:r>
+              <a:rPr lang="en-US" altLang="ko-KR" dirty="0" smtClean="0"/>
+              <a:t>…)</a:t>
+            </a:r>
+          </a:p>
+          <a:p>
+            <a:r>
+              <a:rPr lang="ko-KR" altLang="en-US" dirty="0" smtClean="0"/>
+              <a:t>옆에 누가 </a:t>
+            </a:r>
+            <a:r>
+              <a:rPr lang="ko-KR" altLang="en-US" dirty="0" err="1" smtClean="0"/>
+              <a:t>학습되어있는지</a:t>
+            </a:r>
+            <a:r>
+              <a:rPr lang="ko-KR" altLang="en-US" dirty="0" smtClean="0"/>
+              <a:t> 알려주고</a:t>
+            </a:r>
+            <a:endParaRPr lang="en-US" altLang="ko-KR" dirty="0"/>
+          </a:p>
+          <a:p>
+            <a:endParaRPr lang="ko-KR" altLang="en-US" dirty="0"/>
+          </a:p>
+        </p:txBody>
+      </p:sp>
+    </p:spTree>
+    <p:extLst>
+      <p:ext uri="{BB962C8B-B14F-4D97-AF65-F5344CB8AC3E}">
+        <p14:creationId xmlns:p14="http://schemas.microsoft.com/office/powerpoint/2010/main" val="3531994620"/>
+      </p:ext>
+    </p:extLst>
+  </p:cSld>
+  <p:clrMapOvr>
+    <a:masterClrMapping/>
+  </p:clrMapOvr>
+</p:sld>
+</file>
+
+<file path=ppt/slides/slide6.xml><?xml version="1.0" encoding="utf-8"?>
+<p:sld xmlns:a="http://schemas.openxmlformats.org/drawingml/2006/main" xmlns:r="http://schemas.openxmlformats.org/officeDocument/2006/relationships" xmlns:p="http://schemas.openxmlformats.org/presentationml/2006/main">
+  <p:cSld>
+    <p:spTree>
+      <p:nvGrpSpPr>
+        <p:cNvPr id="1" name=""/>
+        <p:cNvGrpSpPr/>
+        <p:nvPr/>
+      </p:nvGrpSpPr>
+      <p:grpSpPr>
+        <a:xfrm>
+          <a:off x="0" y="0"/>
+          <a:ext cx="0" cy="0"/>
+          <a:chOff x="0" y="0"/>
+          <a:chExt cx="0" cy="0"/>
+        </a:xfrm>
+      </p:grpSpPr>
+      <p:sp>
+        <p:nvSpPr>
+          <p:cNvPr id="2" name="제목 1"/>
+          <p:cNvSpPr>
+            <a:spLocks noGrp="1"/>
+          </p:cNvSpPr>
+          <p:nvPr>
+            <p:ph type="title"/>
+          </p:nvPr>
+        </p:nvSpPr>
+        <p:spPr/>
+        <p:txBody>
+          <a:bodyPr/>
+          <a:lstStyle/>
+          <a:p>
+            <a:r>
+              <a:rPr lang="en-US" altLang="ko-KR" dirty="0" smtClean="0"/>
+              <a:t>170406</a:t>
+            </a:r>
+            <a:endParaRPr lang="ko-KR" altLang="en-US" dirty="0"/>
+          </a:p>
+        </p:txBody>
+      </p:sp>
+      <p:sp>
+        <p:nvSpPr>
+          <p:cNvPr id="3" name="내용 개체 틀 2"/>
+          <p:cNvSpPr>
+            <a:spLocks noGrp="1"/>
+          </p:cNvSpPr>
+          <p:nvPr>
+            <p:ph idx="1"/>
+          </p:nvPr>
+        </p:nvSpPr>
+        <p:spPr>
+          <a:xfrm>
+            <a:off x="228600" y="1431193"/>
+            <a:ext cx="10515600" cy="518990"/>
+          </a:xfrm>
+        </p:spPr>
+        <p:txBody>
+          <a:bodyPr/>
+          <a:lstStyle/>
+          <a:p>
+            <a:r>
+              <a:rPr lang="en-US" altLang="ko-KR" dirty="0" smtClean="0"/>
+              <a:t>UI </a:t>
+            </a:r>
+            <a:r>
+              <a:rPr lang="ko-KR" altLang="en-US" dirty="0" smtClean="0"/>
+              <a:t>디자인</a:t>
+            </a:r>
+            <a:endParaRPr lang="ko-KR" altLang="en-US" dirty="0"/>
+          </a:p>
+        </p:txBody>
+      </p:sp>
+      <p:sp>
+        <p:nvSpPr>
+          <p:cNvPr id="4" name="직사각형 3"/>
+          <p:cNvSpPr/>
+          <p:nvPr/>
+        </p:nvSpPr>
+        <p:spPr>
+          <a:xfrm>
+            <a:off x="382954" y="2344615"/>
+            <a:ext cx="11215077" cy="4157785"/>
+          </a:xfrm>
+          <a:prstGeom prst="rect">
+            <a:avLst/>
+          </a:prstGeom>
+          <a:noFill/>
+          <a:ln>
+            <a:solidFill>
+              <a:schemeClr val="tx1"/>
+            </a:solidFill>
+          </a:ln>
+        </p:spPr>
+        <p:style>
+          <a:lnRef idx="2">
+            <a:schemeClr val="accent1">
+              <a:shade val="50000"/>
+            </a:schemeClr>
+          </a:lnRef>
+          <a:fillRef idx="1">
+            <a:schemeClr val="accent1"/>
+          </a:fillRef>
+          <a:effectRef idx="0">
+            <a:schemeClr val="accent1"/>
+          </a:effectRef>
+          <a:fontRef idx="minor">
+            <a:schemeClr val="lt1"/>
+          </a:fontRef>
+        </p:style>
+        <p:txBody>
+          <a:bodyPr rtlCol="0" anchor="ctr"/>
+          <a:lstStyle/>
+          <a:p>
+            <a:pPr algn="ctr"/>
+            <a:endParaRPr lang="ko-KR" altLang="en-US"/>
+          </a:p>
+        </p:txBody>
+      </p:sp>
+      <p:sp>
+        <p:nvSpPr>
+          <p:cNvPr id="5" name="직사각형 4"/>
+          <p:cNvSpPr/>
+          <p:nvPr/>
+        </p:nvSpPr>
+        <p:spPr>
+          <a:xfrm>
+            <a:off x="1156676" y="2899507"/>
+            <a:ext cx="3024554" cy="1953846"/>
+          </a:xfrm>
+          <a:prstGeom prst="rect">
+            <a:avLst/>
+          </a:prstGeom>
+          <a:noFill/>
+          <a:ln>
+            <a:solidFill>
+              <a:schemeClr val="tx1"/>
+            </a:solidFill>
+          </a:ln>
+        </p:spPr>
+        <p:style>
+          <a:lnRef idx="2">
+            <a:schemeClr val="accent1">
+              <a:shade val="50000"/>
+            </a:schemeClr>
+          </a:lnRef>
+          <a:fillRef idx="1">
+            <a:schemeClr val="accent1"/>
+          </a:fillRef>
+          <a:effectRef idx="0">
+            <a:schemeClr val="accent1"/>
+          </a:effectRef>
+          <a:fontRef idx="minor">
+            <a:schemeClr val="lt1"/>
+          </a:fontRef>
+        </p:style>
+        <p:txBody>
+          <a:bodyPr rtlCol="0" anchor="ctr"/>
+          <a:lstStyle/>
+          <a:p>
+            <a:pPr algn="ctr"/>
+            <a:r>
+              <a:rPr lang="ko-KR" altLang="en-US" err="1" smtClean="0">
+                <a:solidFill>
+                  <a:schemeClr val="tx1"/>
+                </a:solidFill>
+              </a:rPr>
+              <a:t>웹캠</a:t>
+            </a:r>
+            <a:r>
+              <a:rPr lang="ko-KR" altLang="en-US" dirty="0" smtClean="0">
+                <a:solidFill>
+                  <a:schemeClr val="tx1"/>
+                </a:solidFill>
+              </a:rPr>
+              <a:t> 이미지</a:t>
+            </a:r>
+            <a:endParaRPr lang="ko-KR" altLang="en-US" dirty="0">
+              <a:solidFill>
+                <a:schemeClr val="tx1"/>
+              </a:solidFill>
+            </a:endParaRPr>
+          </a:p>
+        </p:txBody>
+      </p:sp>
+      <p:sp>
+        <p:nvSpPr>
+          <p:cNvPr id="6" name="직사각형 5"/>
+          <p:cNvSpPr/>
+          <p:nvPr/>
+        </p:nvSpPr>
+        <p:spPr>
+          <a:xfrm>
+            <a:off x="7256584" y="2661137"/>
+            <a:ext cx="3024554" cy="355114"/>
+          </a:xfrm>
+          <a:prstGeom prst="rect">
+            <a:avLst/>
+          </a:prstGeom>
+          <a:noFill/>
+          <a:ln>
+            <a:solidFill>
+              <a:schemeClr val="tx1"/>
+            </a:solidFill>
+          </a:ln>
+        </p:spPr>
+        <p:style>
+          <a:lnRef idx="2">
+            <a:schemeClr val="accent1">
+              <a:shade val="50000"/>
+            </a:schemeClr>
+          </a:lnRef>
+          <a:fillRef idx="1">
+            <a:schemeClr val="accent1"/>
+          </a:fillRef>
+          <a:effectRef idx="0">
+            <a:schemeClr val="accent1"/>
+          </a:effectRef>
+          <a:fontRef idx="minor">
+            <a:schemeClr val="lt1"/>
+          </a:fontRef>
+        </p:style>
+        <p:txBody>
+          <a:bodyPr rtlCol="0" anchor="ctr"/>
+          <a:lstStyle/>
+          <a:p>
+            <a:pPr algn="ctr"/>
+            <a:r>
+              <a:rPr lang="en-US" altLang="ko-KR" dirty="0" smtClean="0">
+                <a:solidFill>
+                  <a:schemeClr val="tx1"/>
+                </a:solidFill>
+              </a:rPr>
+              <a:t>Train</a:t>
+            </a:r>
+            <a:endParaRPr lang="ko-KR" altLang="en-US" dirty="0">
+              <a:solidFill>
+                <a:schemeClr val="tx1"/>
+              </a:solidFill>
+            </a:endParaRPr>
+          </a:p>
+        </p:txBody>
+      </p:sp>
+      <p:sp>
+        <p:nvSpPr>
+          <p:cNvPr id="7" name="직사각형 6"/>
+          <p:cNvSpPr/>
+          <p:nvPr/>
+        </p:nvSpPr>
+        <p:spPr>
+          <a:xfrm>
+            <a:off x="7256584" y="3160586"/>
+            <a:ext cx="3024554" cy="355114"/>
+          </a:xfrm>
+          <a:prstGeom prst="rect">
+            <a:avLst/>
+          </a:prstGeom>
+          <a:noFill/>
+          <a:ln>
+            <a:solidFill>
+              <a:schemeClr val="tx1"/>
+            </a:solidFill>
+          </a:ln>
+        </p:spPr>
+        <p:style>
+          <a:lnRef idx="2">
+            <a:schemeClr val="accent1">
+              <a:shade val="50000"/>
+            </a:schemeClr>
+          </a:lnRef>
+          <a:fillRef idx="1">
+            <a:schemeClr val="accent1"/>
+          </a:fillRef>
+          <a:effectRef idx="0">
+            <a:schemeClr val="accent1"/>
+          </a:effectRef>
+          <a:fontRef idx="minor">
+            <a:schemeClr val="lt1"/>
+          </a:fontRef>
+        </p:style>
+        <p:txBody>
+          <a:bodyPr rtlCol="0" anchor="ctr"/>
+          <a:lstStyle/>
+          <a:p>
+            <a:pPr algn="ctr"/>
+            <a:r>
+              <a:rPr lang="en-US" altLang="ko-KR" dirty="0" smtClean="0">
+                <a:solidFill>
+                  <a:schemeClr val="tx1"/>
+                </a:solidFill>
+              </a:rPr>
+              <a:t>Test</a:t>
+            </a:r>
+            <a:endParaRPr lang="ko-KR" altLang="en-US" dirty="0">
+              <a:solidFill>
+                <a:schemeClr val="tx1"/>
+              </a:solidFill>
+            </a:endParaRPr>
+          </a:p>
+        </p:txBody>
+      </p:sp>
+      <p:sp>
+        <p:nvSpPr>
+          <p:cNvPr id="8" name="직사각형 7"/>
+          <p:cNvSpPr/>
+          <p:nvPr/>
+        </p:nvSpPr>
+        <p:spPr>
+          <a:xfrm>
+            <a:off x="8045938" y="4054175"/>
+            <a:ext cx="1023806" cy="369332"/>
+          </a:xfrm>
+          <a:prstGeom prst="rect">
+            <a:avLst/>
+          </a:prstGeom>
+        </p:spPr>
+        <p:txBody>
+          <a:bodyPr wrap="none">
+            <a:spAutoFit/>
+          </a:bodyPr>
+          <a:lstStyle/>
+          <a:p>
+            <a:pPr algn="ctr"/>
+            <a:r>
+              <a:rPr lang="en-US" altLang="ko-KR" dirty="0" err="1" smtClean="0"/>
+              <a:t>TrainList</a:t>
+            </a:r>
+            <a:endParaRPr lang="ko-KR" altLang="en-US" dirty="0"/>
+          </a:p>
+        </p:txBody>
+      </p:sp>
+      <p:sp>
+        <p:nvSpPr>
+          <p:cNvPr id="9" name="직사각형 8"/>
+          <p:cNvSpPr/>
+          <p:nvPr/>
+        </p:nvSpPr>
+        <p:spPr>
+          <a:xfrm>
+            <a:off x="7627815" y="4423506"/>
+            <a:ext cx="1946031" cy="1844431"/>
+          </a:xfrm>
+          <a:prstGeom prst="rect">
+            <a:avLst/>
+          </a:prstGeom>
+          <a:noFill/>
+          <a:ln>
+            <a:solidFill>
+              <a:schemeClr val="tx1"/>
+            </a:solidFill>
+          </a:ln>
+        </p:spPr>
+        <p:style>
+          <a:lnRef idx="2">
+            <a:schemeClr val="accent1">
+              <a:shade val="50000"/>
+            </a:schemeClr>
+          </a:lnRef>
+          <a:fillRef idx="1">
+            <a:schemeClr val="accent1"/>
+          </a:fillRef>
+          <a:effectRef idx="0">
+            <a:schemeClr val="accent1"/>
+          </a:effectRef>
+          <a:fontRef idx="minor">
+            <a:schemeClr val="lt1"/>
+          </a:fontRef>
+        </p:style>
+        <p:txBody>
+          <a:bodyPr rtlCol="0" anchor="ctr"/>
+          <a:lstStyle/>
+          <a:p>
+            <a:pPr algn="ctr"/>
+            <a:endParaRPr lang="ko-KR" altLang="en-US" dirty="0">
+              <a:solidFill>
+                <a:schemeClr val="tx1"/>
+              </a:solidFill>
+            </a:endParaRPr>
+          </a:p>
+        </p:txBody>
+      </p:sp>
+      <p:sp>
+        <p:nvSpPr>
+          <p:cNvPr id="11" name="TextBox 10"/>
+          <p:cNvSpPr txBox="1"/>
+          <p:nvPr/>
+        </p:nvSpPr>
+        <p:spPr>
+          <a:xfrm>
+            <a:off x="8192581" y="4423505"/>
+            <a:ext cx="877163" cy="369332"/>
+          </a:xfrm>
+          <a:prstGeom prst="rect">
+            <a:avLst/>
+          </a:prstGeom>
+          <a:noFill/>
+        </p:spPr>
+        <p:txBody>
+          <a:bodyPr wrap="none" rtlCol="0">
+            <a:spAutoFit/>
+          </a:bodyPr>
+          <a:lstStyle/>
+          <a:p>
+            <a:r>
+              <a:rPr lang="ko-KR" altLang="en-US" dirty="0" err="1" smtClean="0"/>
+              <a:t>이협우</a:t>
+            </a:r>
+            <a:endParaRPr lang="ko-KR" altLang="en-US" dirty="0"/>
+          </a:p>
+        </p:txBody>
+      </p:sp>
+      <p:sp>
+        <p:nvSpPr>
+          <p:cNvPr id="12" name="TextBox 11"/>
+          <p:cNvSpPr txBox="1"/>
+          <p:nvPr/>
+        </p:nvSpPr>
+        <p:spPr>
+          <a:xfrm>
+            <a:off x="8162248" y="4738289"/>
+            <a:ext cx="877163" cy="369332"/>
+          </a:xfrm>
+          <a:prstGeom prst="rect">
+            <a:avLst/>
+          </a:prstGeom>
+          <a:noFill/>
+        </p:spPr>
+        <p:txBody>
+          <a:bodyPr wrap="none" rtlCol="0">
+            <a:spAutoFit/>
+          </a:bodyPr>
+          <a:lstStyle/>
+          <a:p>
+            <a:r>
+              <a:rPr lang="ko-KR" altLang="en-US" smtClean="0"/>
+              <a:t>이협우</a:t>
+            </a:r>
+            <a:endParaRPr lang="ko-KR" altLang="en-US" dirty="0"/>
+          </a:p>
+        </p:txBody>
+      </p:sp>
+      <p:sp>
+        <p:nvSpPr>
+          <p:cNvPr id="13" name="직사각형 12"/>
+          <p:cNvSpPr/>
+          <p:nvPr/>
+        </p:nvSpPr>
+        <p:spPr>
+          <a:xfrm>
+            <a:off x="9913814" y="4423505"/>
+            <a:ext cx="1619740" cy="1844432"/>
+          </a:xfrm>
+          <a:prstGeom prst="rect">
+            <a:avLst/>
+          </a:prstGeom>
+          <a:noFill/>
+          <a:ln>
+            <a:solidFill>
+              <a:schemeClr val="tx1"/>
+            </a:solidFill>
+          </a:ln>
+        </p:spPr>
+        <p:style>
+          <a:lnRef idx="2">
+            <a:schemeClr val="accent1">
+              <a:shade val="50000"/>
+            </a:schemeClr>
+          </a:lnRef>
+          <a:fillRef idx="1">
+            <a:schemeClr val="accent1"/>
+          </a:fillRef>
+          <a:effectRef idx="0">
+            <a:schemeClr val="accent1"/>
+          </a:effectRef>
+          <a:fontRef idx="minor">
+            <a:schemeClr val="lt1"/>
+          </a:fontRef>
+        </p:style>
+        <p:txBody>
+          <a:bodyPr rtlCol="0" anchor="ctr"/>
+          <a:lstStyle/>
+          <a:p>
+            <a:pPr algn="ctr"/>
+            <a:r>
+              <a:rPr lang="ko-KR" altLang="en-US" dirty="0" smtClean="0">
+                <a:solidFill>
+                  <a:schemeClr val="tx1"/>
+                </a:solidFill>
+              </a:rPr>
+              <a:t>학습된 대표적인 이미지</a:t>
+            </a:r>
+            <a:endParaRPr lang="ko-KR" altLang="en-US" dirty="0">
+              <a:solidFill>
+                <a:schemeClr val="tx1"/>
+              </a:solidFill>
+            </a:endParaRPr>
+          </a:p>
+        </p:txBody>
+      </p:sp>
+      <p:sp>
+        <p:nvSpPr>
+          <p:cNvPr id="14" name="직사각형 13"/>
+          <p:cNvSpPr/>
+          <p:nvPr/>
+        </p:nvSpPr>
+        <p:spPr>
+          <a:xfrm>
+            <a:off x="561803" y="4878453"/>
+            <a:ext cx="1189749" cy="369332"/>
+          </a:xfrm>
+          <a:prstGeom prst="rect">
+            <a:avLst/>
+          </a:prstGeom>
+        </p:spPr>
+        <p:txBody>
+          <a:bodyPr wrap="none">
+            <a:spAutoFit/>
+          </a:bodyPr>
+          <a:lstStyle/>
+          <a:p>
+            <a:pPr algn="ctr"/>
+            <a:r>
+              <a:rPr lang="ko-KR" altLang="en-US" smtClean="0"/>
+              <a:t>최근 인식</a:t>
+            </a:r>
+            <a:endParaRPr lang="ko-KR" altLang="en-US" dirty="0"/>
+          </a:p>
+        </p:txBody>
+      </p:sp>
+      <p:sp>
+        <p:nvSpPr>
+          <p:cNvPr id="15" name="직사각형 14"/>
+          <p:cNvSpPr/>
+          <p:nvPr/>
+        </p:nvSpPr>
+        <p:spPr>
+          <a:xfrm>
+            <a:off x="2668953" y="4878453"/>
+            <a:ext cx="1189749" cy="369332"/>
+          </a:xfrm>
+          <a:prstGeom prst="rect">
+            <a:avLst/>
+          </a:prstGeom>
+        </p:spPr>
+        <p:txBody>
+          <a:bodyPr wrap="none">
+            <a:spAutoFit/>
+          </a:bodyPr>
+          <a:lstStyle/>
+          <a:p>
+            <a:pPr algn="ctr"/>
+            <a:r>
+              <a:rPr lang="ko-KR" altLang="en-US" dirty="0" smtClean="0"/>
+              <a:t>현재 인식</a:t>
+            </a:r>
+            <a:endParaRPr lang="ko-KR" altLang="en-US" dirty="0"/>
+          </a:p>
+        </p:txBody>
+      </p:sp>
+      <p:sp>
+        <p:nvSpPr>
+          <p:cNvPr id="16" name="TextBox 15"/>
+          <p:cNvSpPr txBox="1"/>
+          <p:nvPr/>
+        </p:nvSpPr>
+        <p:spPr>
+          <a:xfrm>
+            <a:off x="718094" y="5161055"/>
+            <a:ext cx="877163" cy="369332"/>
+          </a:xfrm>
+          <a:prstGeom prst="rect">
+            <a:avLst/>
+          </a:prstGeom>
+          <a:noFill/>
+        </p:spPr>
+        <p:txBody>
+          <a:bodyPr wrap="none" rtlCol="0">
+            <a:spAutoFit/>
+          </a:bodyPr>
+          <a:lstStyle/>
+          <a:p>
+            <a:r>
+              <a:rPr lang="ko-KR" altLang="en-US" dirty="0" err="1" smtClean="0"/>
+              <a:t>이협우</a:t>
+            </a:r>
+            <a:endParaRPr lang="ko-KR" altLang="en-US" dirty="0"/>
+          </a:p>
+        </p:txBody>
+      </p:sp>
+      <p:sp>
+        <p:nvSpPr>
+          <p:cNvPr id="17" name="직사각형 16"/>
+          <p:cNvSpPr/>
+          <p:nvPr/>
+        </p:nvSpPr>
+        <p:spPr>
+          <a:xfrm>
+            <a:off x="718094" y="5550019"/>
+            <a:ext cx="915384" cy="835488"/>
+          </a:xfrm>
+          <a:prstGeom prst="rect">
+            <a:avLst/>
+          </a:prstGeom>
+          <a:noFill/>
+          <a:ln>
+            <a:solidFill>
+              <a:schemeClr val="tx1"/>
+            </a:solidFill>
+          </a:ln>
+        </p:spPr>
+        <p:style>
+          <a:lnRef idx="2">
+            <a:schemeClr val="accent1">
+              <a:shade val="50000"/>
+            </a:schemeClr>
+          </a:lnRef>
+          <a:fillRef idx="1">
+            <a:schemeClr val="accent1"/>
+          </a:fillRef>
+          <a:effectRef idx="0">
+            <a:schemeClr val="accent1"/>
+          </a:effectRef>
+          <a:fontRef idx="minor">
+            <a:schemeClr val="lt1"/>
+          </a:fontRef>
+        </p:style>
+        <p:txBody>
+          <a:bodyPr rtlCol="0" anchor="ctr"/>
+          <a:lstStyle/>
+          <a:p>
+            <a:pPr algn="ctr"/>
+            <a:endParaRPr lang="ko-KR" altLang="en-US" dirty="0">
+              <a:solidFill>
+                <a:schemeClr val="tx1"/>
+              </a:solidFill>
+            </a:endParaRPr>
+          </a:p>
+        </p:txBody>
+      </p:sp>
+      <p:sp>
+        <p:nvSpPr>
+          <p:cNvPr id="18" name="TextBox 17"/>
+          <p:cNvSpPr txBox="1"/>
+          <p:nvPr/>
+        </p:nvSpPr>
+        <p:spPr>
+          <a:xfrm>
+            <a:off x="2825245" y="5180687"/>
+            <a:ext cx="646331" cy="369332"/>
+          </a:xfrm>
+          <a:prstGeom prst="rect">
+            <a:avLst/>
+          </a:prstGeom>
+          <a:noFill/>
+        </p:spPr>
+        <p:txBody>
+          <a:bodyPr wrap="none" rtlCol="0">
+            <a:spAutoFit/>
+          </a:bodyPr>
+          <a:lstStyle/>
+          <a:p>
+            <a:r>
+              <a:rPr lang="ko-KR" altLang="en-US" dirty="0" smtClean="0"/>
+              <a:t>없음</a:t>
+            </a:r>
+            <a:endParaRPr lang="ko-KR" altLang="en-US" dirty="0"/>
+          </a:p>
+        </p:txBody>
+      </p:sp>
+      <p:sp>
+        <p:nvSpPr>
+          <p:cNvPr id="19" name="직사각형 18"/>
+          <p:cNvSpPr/>
+          <p:nvPr/>
+        </p:nvSpPr>
+        <p:spPr>
+          <a:xfrm>
+            <a:off x="2787024" y="5550019"/>
+            <a:ext cx="915384" cy="835488"/>
+          </a:xfrm>
+          <a:prstGeom prst="rect">
+            <a:avLst/>
+          </a:prstGeom>
+          <a:noFill/>
+          <a:ln>
+            <a:solidFill>
+              <a:schemeClr val="tx1"/>
+            </a:solidFill>
+          </a:ln>
+        </p:spPr>
+        <p:style>
+          <a:lnRef idx="2">
+            <a:schemeClr val="accent1">
+              <a:shade val="50000"/>
+            </a:schemeClr>
+          </a:lnRef>
+          <a:fillRef idx="1">
+            <a:schemeClr val="accent1"/>
+          </a:fillRef>
+          <a:effectRef idx="0">
+            <a:schemeClr val="accent1"/>
+          </a:effectRef>
+          <a:fontRef idx="minor">
+            <a:schemeClr val="lt1"/>
+          </a:fontRef>
+        </p:style>
+        <p:txBody>
+          <a:bodyPr rtlCol="0" anchor="ctr"/>
+          <a:lstStyle/>
+          <a:p>
+            <a:pPr algn="ctr"/>
+            <a:endParaRPr lang="ko-KR" altLang="en-US" dirty="0">
+              <a:solidFill>
+                <a:schemeClr val="tx1"/>
+              </a:solidFill>
+            </a:endParaRPr>
+          </a:p>
+        </p:txBody>
+      </p:sp>
+    </p:spTree>
+    <p:extLst>
+      <p:ext uri="{BB962C8B-B14F-4D97-AF65-F5344CB8AC3E}">
+        <p14:creationId xmlns:p14="http://schemas.microsoft.com/office/powerpoint/2010/main" val="3765431964"/>
       </p:ext>
     </p:extLst>
   </p:cSld>
@@ -3995,4 +5332,265 @@
     </a:ext>
   </a:extLst>
 </a:theme>
+</file>
+
+<file path=ppt/theme/theme2.xml><?xml version="1.0" encoding="utf-8"?>
+<a:theme xmlns:a="http://schemas.openxmlformats.org/drawingml/2006/main" name="Office 테마">
+  <a:themeElements>
+    <a:clrScheme name="Office">
+      <a:dk1>
+        <a:sysClr val="windowText" lastClr="000000"/>
+      </a:dk1>
+      <a:lt1>
+        <a:sysClr val="window" lastClr="FFFFFF"/>
+      </a:lt1>
+      <a:dk2>
+        <a:srgbClr val="44546A"/>
+      </a:dk2>
+      <a:lt2>
+        <a:srgbClr val="E7E6E6"/>
+      </a:lt2>
+      <a:accent1>
+        <a:srgbClr val="5B9BD5"/>
+      </a:accent1>
+      <a:accent2>
+        <a:srgbClr val="ED7D31"/>
+      </a:accent2>
+      <a:accent3>
+        <a:srgbClr val="A5A5A5"/>
+      </a:accent3>
+      <a:accent4>
+        <a:srgbClr val="FFC000"/>
+      </a:accent4>
+      <a:accent5>
+        <a:srgbClr val="4472C4"/>
+      </a:accent5>
+      <a:accent6>
+        <a:srgbClr val="70AD47"/>
+      </a:accent6>
+      <a:hlink>
+        <a:srgbClr val="0563C1"/>
+      </a:hlink>
+      <a:folHlink>
+        <a:srgbClr val="954F72"/>
+      </a:folHlink>
+    </a:clrScheme>
+    <a:fontScheme name="Office">
+      <a:majorFont>
+        <a:latin typeface="맑은 고딕" panose="020F0302020204030204"/>
+        <a:ea typeface=""/>
+        <a:cs typeface=""/>
+        <a:font script="Jpan" typeface="游ゴシック Light"/>
+        <a:font script="Hang" typeface="맑은 고딕"/>
+        <a:font script="Hans" typeface="等线 Light"/>
+        <a:font script="Hant" typeface="新細明體"/>
+        <a:font script="Arab" typeface="Times New Roman"/>
+        <a:font script="Hebr" typeface="Times New Roman"/>
+        <a:font script="Thai" typeface="Angsana New"/>
+        <a:font script="Ethi" typeface="Nyala"/>
+        <a:font script="Beng" typeface="Vrinda"/>
+        <a:font script="Gujr" typeface="Shruti"/>
+        <a:font script="Khmr" typeface="MoolBoran"/>
+        <a:font script="Knda" typeface="Tunga"/>
+        <a:font script="Guru" typeface="Raavi"/>
+        <a:font script="Cans" typeface="Euphemia"/>
+        <a:font script="Cher" typeface="Plantagenet Cherokee"/>
+        <a:font script="Yiii" typeface="Microsoft Yi Baiti"/>
+        <a:font script="Tibt" typeface="Microsoft Himalaya"/>
+        <a:font script="Thaa" typeface="MV Boli"/>
+        <a:font script="Deva" typeface="Mangal"/>
+        <a:font script="Telu" typeface="Gautami"/>
+        <a:font script="Taml" typeface="Latha"/>
+        <a:font script="Syrc" typeface="Estrangelo Edessa"/>
+        <a:font script="Orya" typeface="Kalinga"/>
+        <a:font script="Mlym" typeface="Kartika"/>
+        <a:font script="Laoo" typeface="DokChampa"/>
+        <a:font script="Sinh" typeface="Iskoola Pota"/>
+        <a:font script="Mong" typeface="Mongolian Baiti"/>
+        <a:font script="Viet" typeface="Times New Roman"/>
+        <a:font script="Uigh" typeface="Microsoft Uighur"/>
+        <a:font script="Geor" typeface="Sylfaen"/>
+      </a:majorFont>
+      <a:minorFont>
+        <a:latin typeface="맑은 고딕" panose="020F0502020204030204"/>
+        <a:ea typeface=""/>
+        <a:cs typeface=""/>
+        <a:font script="Jpan" typeface="游ゴシック"/>
+        <a:font script="Hang" typeface="맑은 고딕"/>
+        <a:font script="Hans" typeface="等线"/>
+        <a:font script="Hant" typeface="新細明體"/>
+        <a:font script="Arab" typeface="Arial"/>
+        <a:font script="Hebr" typeface="Arial"/>
+        <a:font script="Thai" typeface="Cordia New"/>
+        <a:font script="Ethi" typeface="Nyala"/>
+        <a:font script="Beng" typeface="Vrinda"/>
+        <a:font script="Gujr" typeface="Shruti"/>
+        <a:font script="Khmr" typeface="DaunPenh"/>
+        <a:font script="Knda" typeface="Tunga"/>
+        <a:font script="Guru" typeface="Raavi"/>
+        <a:font script="Cans" typeface="Euphemia"/>
+        <a:font script="Cher" typeface="Plantagenet Cherokee"/>
+        <a:font script="Yiii" typeface="Microsoft Yi Baiti"/>
+        <a:font script="Tibt" typeface="Microsoft Himalaya"/>
+        <a:font script="Thaa" typeface="MV Boli"/>
+        <a:font script="Deva" typeface="Mangal"/>
+        <a:font script="Telu" typeface="Gautami"/>
+        <a:font script="Taml" typeface="Latha"/>
+        <a:font script="Syrc" typeface="Estrangelo Edessa"/>
+        <a:font script="Orya" typeface="Kalinga"/>
+        <a:font script="Mlym" typeface="Kartika"/>
+        <a:font script="Laoo" typeface="DokChampa"/>
+        <a:font script="Sinh" typeface="Iskoola Pota"/>
+        <a:font script="Mong" typeface="Mongolian Baiti"/>
+        <a:font script="Viet" typeface="Arial"/>
+        <a:font script="Uigh" typeface="Microsoft Uighur"/>
+        <a:font script="Geor" typeface="Sylfaen"/>
+      </a:minorFont>
+    </a:fontScheme>
+    <a:fmtScheme name="Office">
+      <a:fillStyleLst>
+        <a:solidFill>
+          <a:schemeClr val="phClr"/>
+        </a:solidFill>
+        <a:gradFill rotWithShape="1">
+          <a:gsLst>
+            <a:gs pos="0">
+              <a:schemeClr val="phClr">
+                <a:lumMod val="110000"/>
+                <a:satMod val="105000"/>
+                <a:tint val="67000"/>
+              </a:schemeClr>
+            </a:gs>
+            <a:gs pos="50000">
+              <a:schemeClr val="phClr">
+                <a:lumMod val="105000"/>
+                <a:satMod val="103000"/>
+                <a:tint val="73000"/>
+              </a:schemeClr>
+            </a:gs>
+            <a:gs pos="100000">
+              <a:schemeClr val="phClr">
+                <a:lumMod val="105000"/>
+                <a:satMod val="109000"/>
+                <a:tint val="81000"/>
+              </a:schemeClr>
+            </a:gs>
+          </a:gsLst>
+          <a:lin ang="5400000" scaled="0"/>
+        </a:gradFill>
+        <a:gradFill rotWithShape="1">
+          <a:gsLst>
+            <a:gs pos="0">
+              <a:schemeClr val="phClr">
+                <a:satMod val="103000"/>
+                <a:lumMod val="102000"/>
+                <a:tint val="94000"/>
+              </a:schemeClr>
+            </a:gs>
+            <a:gs pos="50000">
+              <a:schemeClr val="phClr">
+                <a:satMod val="110000"/>
+                <a:lumMod val="100000"/>
+                <a:shade val="100000"/>
+              </a:schemeClr>
+            </a:gs>
+            <a:gs pos="100000">
+              <a:schemeClr val="phClr">
+                <a:lumMod val="99000"/>
+                <a:satMod val="120000"/>
+                <a:shade val="78000"/>
+              </a:schemeClr>
+            </a:gs>
+          </a:gsLst>
+          <a:lin ang="5400000" scaled="0"/>
+        </a:gradFill>
+      </a:fillStyleLst>
+      <a:lnStyleLst>
+        <a:ln w="6350" cap="flat" cmpd="sng" algn="ctr">
+          <a:solidFill>
+            <a:schemeClr val="phClr"/>
+          </a:solidFill>
+          <a:prstDash val="solid"/>
+          <a:miter lim="800000"/>
+        </a:ln>
+        <a:ln w="12700" cap="flat" cmpd="sng" algn="ctr">
+          <a:solidFill>
+            <a:schemeClr val="phClr"/>
+          </a:solidFill>
+          <a:prstDash val="solid"/>
+          <a:miter lim="800000"/>
+        </a:ln>
+        <a:ln w="19050" cap="flat" cmpd="sng" algn="ctr">
+          <a:solidFill>
+            <a:schemeClr val="phClr"/>
+          </a:solidFill>
+          <a:prstDash val="solid"/>
+          <a:miter lim="800000"/>
+        </a:ln>
+      </a:lnStyleLst>
+      <a:effectStyleLst>
+        <a:effectStyle>
+          <a:effectLst/>
+        </a:effectStyle>
+        <a:effectStyle>
+          <a:effectLst/>
+        </a:effectStyle>
+        <a:effectStyle>
+          <a:effectLst>
+            <a:outerShdw blurRad="57150" dist="19050" dir="5400000" algn="ctr" rotWithShape="0">
+              <a:srgbClr val="000000">
+                <a:alpha val="63000"/>
+              </a:srgbClr>
+            </a:outerShdw>
+          </a:effectLst>
+        </a:effectStyle>
+      </a:effectStyleLst>
+      <a:bgFillStyleLst>
+        <a:solidFill>
+          <a:schemeClr val="phClr"/>
+        </a:solidFill>
+        <a:solidFill>
+          <a:schemeClr val="phClr">
+            <a:tint val="95000"/>
+            <a:satMod val="170000"/>
+          </a:schemeClr>
+        </a:solidFill>
+        <a:gradFill rotWithShape="1">
+          <a:gsLst>
+            <a:gs pos="0">
+              <a:schemeClr val="phClr">
+                <a:tint val="93000"/>
+                <a:satMod val="150000"/>
+                <a:shade val="98000"/>
+                <a:lumMod val="102000"/>
+              </a:schemeClr>
+            </a:gs>
+            <a:gs pos="50000">
+              <a:schemeClr val="phClr">
+                <a:tint val="98000"/>
+                <a:satMod val="130000"/>
+                <a:shade val="90000"/>
+                <a:lumMod val="103000"/>
+              </a:schemeClr>
+            </a:gs>
+            <a:gs pos="100000">
+              <a:schemeClr val="phClr">
+                <a:shade val="63000"/>
+                <a:satMod val="120000"/>
+              </a:schemeClr>
+            </a:gs>
+          </a:gsLst>
+          <a:lin ang="5400000" scaled="0"/>
+        </a:gradFill>
+      </a:bgFillStyleLst>
+    </a:fmtScheme>
+  </a:themeElements>
+  <a:objectDefaults/>
+  <a:extraClrSchemeLst/>
+  <a:extLst>
+    <a:ext uri="{05A4C25C-085E-4340-85A3-A5531E510DB2}">
+      <thm15:themeFamily xmlns:thm15="http://schemas.microsoft.com/office/thememl/2012/main" name="Office Theme" id="{62F939B6-93AF-4DB8-9C6B-D6C7DFDC589F}" vid="{4A3C46E8-61CC-4603-A589-7422A47A8E4A}"/>
+    </a:ext>
+  </a:extLst>
+</a:theme>
 </file>
</xml_diff>